<commit_message>
L01 Added additional user for code review
</commit_message>
<xml_diff>
--- a/Lectures/Lesson 01 - Gitlab + Intellij IDEA.pptx
+++ b/Lectures/Lesson 01 - Gitlab + Intellij IDEA.pptx
@@ -683,7 +683,7 @@
           <a:p>
             <a:fld id="{E15541E6-0256-43E9-BC00-FD6AEADE0B20}" type="datetimeFigureOut">
               <a:rPr lang="en-US" smtClean="0"/>
-              <a:t>10/1/2019</a:t>
+              <a:t>10/1/19</a:t>
             </a:fld>
             <a:endParaRPr lang="en-US"/>
           </a:p>
@@ -842,7 +842,7 @@
           <a:p>
             <a:fld id="{46A72ACF-8CBE-46E1-8319-40131CE74C9D}" type="slidenum">
               <a:rPr lang="en-US" smtClean="0"/>
-              <a:t>‹№›</a:t>
+              <a:t>‹#›</a:t>
             </a:fld>
             <a:endParaRPr lang="en-US"/>
           </a:p>
@@ -4477,7 +4477,7 @@
           <a:p>
             <a:fld id="{A90B2C51-5890-490E-B5FE-9637AEB78E72}" type="slidenum">
               <a:rPr lang="en-US" smtClean="0"/>
-              <a:t>‹№›</a:t>
+              <a:t>‹#›</a:t>
             </a:fld>
             <a:endParaRPr lang="en-US"/>
           </a:p>
@@ -5067,7 +5067,7 @@
           <a:p>
             <a:fld id="{A90B2C51-5890-490E-B5FE-9637AEB78E72}" type="slidenum">
               <a:rPr lang="en-US" smtClean="0"/>
-              <a:t>‹№›</a:t>
+              <a:t>‹#›</a:t>
             </a:fld>
             <a:endParaRPr lang="en-US"/>
           </a:p>
@@ -5727,7 +5727,7 @@
           <a:p>
             <a:fld id="{A90B2C51-5890-490E-B5FE-9637AEB78E72}" type="slidenum">
               <a:rPr lang="en-US" smtClean="0"/>
-              <a:t>‹№›</a:t>
+              <a:t>‹#›</a:t>
             </a:fld>
             <a:endParaRPr lang="en-US"/>
           </a:p>
@@ -6520,7 +6520,7 @@
           <a:p>
             <a:fld id="{A90B2C51-5890-490E-B5FE-9637AEB78E72}" type="slidenum">
               <a:rPr lang="en-US" smtClean="0"/>
-              <a:t>‹№›</a:t>
+              <a:t>‹#›</a:t>
             </a:fld>
             <a:endParaRPr lang="en-US"/>
           </a:p>
@@ -6825,7 +6825,7 @@
           <a:p>
             <a:fld id="{A90B2C51-5890-490E-B5FE-9637AEB78E72}" type="slidenum">
               <a:rPr lang="en-US" smtClean="0"/>
-              <a:t>‹№›</a:t>
+              <a:t>‹#›</a:t>
             </a:fld>
             <a:endParaRPr lang="en-US"/>
           </a:p>
@@ -7219,7 +7219,7 @@
           <a:p>
             <a:fld id="{A90B2C51-5890-490E-B5FE-9637AEB78E72}" type="slidenum">
               <a:rPr lang="en-US" smtClean="0"/>
-              <a:t>‹№›</a:t>
+              <a:t>‹#›</a:t>
             </a:fld>
             <a:endParaRPr lang="en-US"/>
           </a:p>
@@ -7886,7 +7886,7 @@
           <a:p>
             <a:fld id="{A90B2C51-5890-490E-B5FE-9637AEB78E72}" type="slidenum">
               <a:rPr lang="en-US" smtClean="0"/>
-              <a:t>‹№›</a:t>
+              <a:t>‹#›</a:t>
             </a:fld>
             <a:endParaRPr lang="en-US"/>
           </a:p>
@@ -11567,6 +11567,22 @@
                   <a:prstClr val="black"/>
                 </a:solidFill>
               </a:rPr>
+              <a:t>, </a:t>
+            </a:r>
+            <a:r>
+              <a:rPr lang="en-US" sz="2400" b="1" dirty="0" err="1">
+                <a:solidFill>
+                  <a:prstClr val="black"/>
+                </a:solidFill>
+              </a:rPr>
+              <a:t>InnaBakum</a:t>
+            </a:r>
+            <a:r>
+              <a:rPr lang="en-US" sz="2400" b="1" dirty="0">
+                <a:solidFill>
+                  <a:prstClr val="black"/>
+                </a:solidFill>
+              </a:rPr>
               <a:t> </a:t>
             </a:r>
             <a:r>

</xml_diff>

<commit_message>
L01 Add additional users for code review
</commit_message>
<xml_diff>
--- a/Lectures/Lesson 01 - Gitlab + Intellij IDEA.pptx
+++ b/Lectures/Lesson 01 - Gitlab + Intellij IDEA.pptx
@@ -683,7 +683,7 @@
           <a:p>
             <a:fld id="{E15541E6-0256-43E9-BC00-FD6AEADE0B20}" type="datetimeFigureOut">
               <a:rPr lang="en-US" smtClean="0"/>
-              <a:t>10/1/19</a:t>
+              <a:t>10/1/2019</a:t>
             </a:fld>
             <a:endParaRPr lang="en-US"/>
           </a:p>
@@ -9782,7 +9782,7 @@
         </p:spPr>
         <p:txBody>
           <a:bodyPr>
-            <a:normAutofit fontScale="92500" lnSpcReduction="10000"/>
+            <a:normAutofit fontScale="92500" lnSpcReduction="20000"/>
           </a:bodyPr>
           <a:lstStyle>
             <a:defPPr marR="0" lvl="0" algn="l" rtl="0">
@@ -11217,7 +11217,7 @@
         <p:spPr>
           <a:xfrm>
             <a:off x="839788" y="2057400"/>
-            <a:ext cx="3932237" cy="3811588"/>
+            <a:ext cx="4877271" cy="3811588"/>
           </a:xfrm>
           <a:prstGeom prst="rect">
             <a:avLst/>
@@ -11225,7 +11225,7 @@
         </p:spPr>
         <p:txBody>
           <a:bodyPr>
-            <a:normAutofit fontScale="92500"/>
+            <a:normAutofit lnSpcReduction="10000"/>
           </a:bodyPr>
           <a:lstStyle>
             <a:defPPr marR="0" lvl="0" algn="l" rtl="0">
@@ -11514,15 +11514,15 @@
               <a:buChar char="•"/>
             </a:pPr>
             <a:r>
-              <a:rPr lang="en-US" sz="2400" dirty="0">
+              <a:rPr lang="en-US" sz="2400" dirty="0" smtClean="0">
                 <a:solidFill>
                   <a:prstClr val="black"/>
                 </a:solidFill>
               </a:rPr>
-              <a:t>Choose </a:t>
-            </a:r>
-            <a:r>
-              <a:rPr lang="en-US" sz="2400" b="1" dirty="0" err="1">
+              <a:t>Add </a:t>
+            </a:r>
+            <a:r>
+              <a:rPr lang="en-US" sz="2400" b="1" dirty="0" err="1" smtClean="0">
                 <a:solidFill>
                   <a:prstClr val="black"/>
                 </a:solidFill>
@@ -11530,7 +11530,7 @@
               <a:t>olexandr.kucher</a:t>
             </a:r>
             <a:r>
-              <a:rPr lang="en-US" sz="2400" b="1" dirty="0">
+              <a:rPr lang="en-US" sz="2400" b="1" dirty="0" smtClean="0">
                 <a:solidFill>
                   <a:prstClr val="black"/>
                 </a:solidFill>
@@ -11538,7 +11538,7 @@
               <a:t>, </a:t>
             </a:r>
             <a:r>
-              <a:rPr lang="en-US" sz="2400" b="1" dirty="0" err="1">
+              <a:rPr lang="en-US" sz="2400" b="1" dirty="0" err="1" smtClean="0">
                 <a:solidFill>
                   <a:prstClr val="black"/>
                 </a:solidFill>
@@ -11546,7 +11546,7 @@
               <a:t>y.brahinets</a:t>
             </a:r>
             <a:r>
-              <a:rPr lang="en-US" sz="2400" b="1" dirty="0">
+              <a:rPr lang="en-US" sz="2400" b="1" dirty="0" smtClean="0">
                 <a:solidFill>
                   <a:prstClr val="black"/>
                 </a:solidFill>
@@ -11554,7 +11554,7 @@
               <a:t>, </a:t>
             </a:r>
             <a:r>
-              <a:rPr lang="en-US" sz="2400" b="1" dirty="0" err="1">
+              <a:rPr lang="en-US" sz="2400" b="1" dirty="0" err="1" smtClean="0">
                 <a:solidFill>
                   <a:prstClr val="black"/>
                 </a:solidFill>
@@ -11562,7 +11562,31 @@
               <a:t>vrudas</a:t>
             </a:r>
             <a:r>
-              <a:rPr lang="en-US" sz="2400" b="1" dirty="0">
+              <a:rPr lang="en-US" sz="2400" b="1" dirty="0" smtClean="0">
+                <a:solidFill>
+                  <a:prstClr val="black"/>
+                </a:solidFill>
+              </a:rPr>
+              <a:t>,</a:t>
+            </a:r>
+            <a:r>
+              <a:rPr lang="en-US" sz="2400" b="1" dirty="0" smtClean="0">
+                <a:solidFill>
+                  <a:prstClr val="black"/>
+                </a:solidFill>
+              </a:rPr>
+              <a:t> </a:t>
+            </a:r>
+            <a:r>
+              <a:rPr lang="en-US" sz="2400" b="1" dirty="0" err="1" smtClean="0">
+                <a:solidFill>
+                  <a:prstClr val="black"/>
+                </a:solidFill>
+              </a:rPr>
+              <a:t>InnaBakum</a:t>
+            </a:r>
+            <a:r>
+              <a:rPr lang="en-US" sz="2400" b="1" dirty="0" smtClean="0">
                 <a:solidFill>
                   <a:prstClr val="black"/>
                 </a:solidFill>
@@ -11570,15 +11594,15 @@
               <a:t>, </a:t>
             </a:r>
             <a:r>
-              <a:rPr lang="en-US" sz="2400" b="1" dirty="0" err="1">
-                <a:solidFill>
-                  <a:prstClr val="black"/>
-                </a:solidFill>
-              </a:rPr>
-              <a:t>InnaBakum</a:t>
-            </a:r>
-            <a:r>
-              <a:rPr lang="en-US" sz="2400" b="1" dirty="0">
+              <a:rPr lang="en-US" sz="2400" b="1" dirty="0" err="1" smtClean="0"/>
+              <a:t>mudrenko.vlad</a:t>
+            </a:r>
+            <a:r>
+              <a:rPr lang="en-US" sz="2400" b="1" dirty="0" smtClean="0"/>
+              <a:t>, michaelsav4enko</a:t>
+            </a:r>
+            <a:r>
+              <a:rPr lang="en-US" sz="2400" b="1" dirty="0" smtClean="0">
                 <a:solidFill>
                   <a:prstClr val="black"/>
                 </a:solidFill>
@@ -11586,7 +11610,7 @@
               <a:t> </a:t>
             </a:r>
             <a:r>
-              <a:rPr lang="en-US" sz="2400" dirty="0">
+              <a:rPr lang="en-US" sz="2400" dirty="0" smtClean="0">
                 <a:solidFill>
                   <a:prstClr val="black"/>
                 </a:solidFill>
@@ -11594,13 +11618,18 @@
               <a:t>as </a:t>
             </a:r>
             <a:r>
-              <a:rPr lang="en-US" sz="2400" b="1" dirty="0">
+              <a:rPr lang="en-US" sz="2400" b="1" dirty="0" smtClean="0">
                 <a:solidFill>
                   <a:prstClr val="black"/>
                 </a:solidFill>
               </a:rPr>
               <a:t>Reporter</a:t>
             </a:r>
+            <a:endParaRPr lang="en-US" sz="2400" b="1" dirty="0">
+              <a:solidFill>
+                <a:prstClr val="black"/>
+              </a:solidFill>
+            </a:endParaRPr>
           </a:p>
           <a:p>
             <a:pPr marL="228600" indent="-228600">
@@ -15154,7 +15183,7 @@
               <a:buChar char="•"/>
             </a:pPr>
             <a:r>
-              <a:rPr lang="en-US" sz="2400">
+              <a:rPr lang="en-US" sz="2400" dirty="0">
                 <a:solidFill>
                   <a:prstClr val="black"/>
                 </a:solidFill>
@@ -15171,7 +15200,7 @@
               <a:buChar char="•"/>
             </a:pPr>
             <a:r>
-              <a:rPr lang="en-US" sz="2400">
+              <a:rPr lang="en-US" sz="2400" dirty="0">
                 <a:solidFill>
                   <a:prstClr val="black"/>
                 </a:solidFill>
@@ -15179,15 +15208,31 @@
               <a:t>Press </a:t>
             </a:r>
             <a:r>
-              <a:rPr lang="en-US" sz="2400" b="1">
+              <a:rPr lang="en-US" sz="2400" b="1" dirty="0">
                 <a:solidFill>
                   <a:prstClr val="black"/>
                 </a:solidFill>
               </a:rPr>
-              <a:t>“Ctrl+K”</a:t>
-            </a:r>
-            <a:r>
-              <a:rPr lang="en-US" sz="2400">
+              <a:t>“</a:t>
+            </a:r>
+            <a:r>
+              <a:rPr lang="en-US" sz="2400" b="1" dirty="0" err="1">
+                <a:solidFill>
+                  <a:prstClr val="black"/>
+                </a:solidFill>
+              </a:rPr>
+              <a:t>Ctrl+K</a:t>
+            </a:r>
+            <a:r>
+              <a:rPr lang="en-US" sz="2400" b="1" dirty="0">
+                <a:solidFill>
+                  <a:prstClr val="black"/>
+                </a:solidFill>
+              </a:rPr>
+              <a:t>”</a:t>
+            </a:r>
+            <a:r>
+              <a:rPr lang="en-US" sz="2400" dirty="0">
                 <a:solidFill>
                   <a:prstClr val="black"/>
                 </a:solidFill>
@@ -15204,7 +15249,7 @@
               <a:buChar char="•"/>
             </a:pPr>
             <a:r>
-              <a:rPr lang="en-US" sz="2400">
+              <a:rPr lang="en-US" sz="2400" dirty="0">
                 <a:solidFill>
                   <a:prstClr val="black"/>
                 </a:solidFill>
@@ -15221,7 +15266,7 @@
               <a:buChar char="•"/>
             </a:pPr>
             <a:r>
-              <a:rPr lang="en-US" sz="2400">
+              <a:rPr lang="en-US" sz="2400" dirty="0">
                 <a:solidFill>
                   <a:prstClr val="black"/>
                 </a:solidFill>
@@ -15229,12 +15274,20 @@
               <a:t>Type understandable and informative </a:t>
             </a:r>
             <a:r>
-              <a:rPr lang="en-US" sz="2400" b="1">
+              <a:rPr lang="en-US" sz="2400" b="1" dirty="0" smtClean="0">
                 <a:solidFill>
                   <a:prstClr val="black"/>
                 </a:solidFill>
               </a:rPr>
-              <a:t>“Commit Message”</a:t>
+              <a:t>“L## Commit </a:t>
+            </a:r>
+            <a:r>
+              <a:rPr lang="en-US" sz="2400" b="1" dirty="0">
+                <a:solidFill>
+                  <a:prstClr val="black"/>
+                </a:solidFill>
+              </a:rPr>
+              <a:t>Message”</a:t>
             </a:r>
           </a:p>
           <a:p>
@@ -15246,7 +15299,7 @@
               <a:buChar char="•"/>
             </a:pPr>
             <a:r>
-              <a:rPr lang="en-US" sz="2400">
+              <a:rPr lang="en-US" sz="2400" dirty="0">
                 <a:solidFill>
                   <a:prstClr val="black"/>
                 </a:solidFill>
@@ -15254,7 +15307,7 @@
               <a:t>Check checkboxes: </a:t>
             </a:r>
             <a:r>
-              <a:rPr lang="en-US" sz="2400" b="1">
+              <a:rPr lang="en-US" sz="2400" b="1" dirty="0">
                 <a:solidFill>
                   <a:prstClr val="black"/>
                 </a:solidFill>
@@ -15262,7 +15315,7 @@
               <a:t>“Perform code analysis” </a:t>
             </a:r>
             <a:r>
-              <a:rPr lang="en-US" sz="2400">
+              <a:rPr lang="en-US" sz="2400" dirty="0">
                 <a:solidFill>
                   <a:prstClr val="black"/>
                 </a:solidFill>
@@ -15270,14 +15323,14 @@
               <a:t>and </a:t>
             </a:r>
             <a:r>
-              <a:rPr lang="en-US" sz="2400" b="1">
+              <a:rPr lang="en-US" sz="2400" b="1" dirty="0">
                 <a:solidFill>
                   <a:prstClr val="black"/>
                 </a:solidFill>
               </a:rPr>
               <a:t>“Check TODO”</a:t>
             </a:r>
-            <a:endParaRPr lang="en-US" sz="2400">
+            <a:endParaRPr lang="en-US" sz="2400" dirty="0">
               <a:solidFill>
                 <a:prstClr val="black"/>
               </a:solidFill>
@@ -15292,7 +15345,7 @@
               <a:buChar char="•"/>
             </a:pPr>
             <a:r>
-              <a:rPr lang="en-US" sz="2400">
+              <a:rPr lang="en-US" sz="2400" dirty="0">
                 <a:solidFill>
                   <a:prstClr val="black"/>
                 </a:solidFill>
@@ -15300,18 +15353,13 @@
               <a:t>Click </a:t>
             </a:r>
             <a:r>
-              <a:rPr lang="en-US" sz="2400" b="1">
+              <a:rPr lang="en-US" sz="2400" b="1" dirty="0">
                 <a:solidFill>
                   <a:prstClr val="black"/>
                 </a:solidFill>
               </a:rPr>
               <a:t>“Commit”</a:t>
             </a:r>
-            <a:endParaRPr lang="en-US" sz="2400" b="1" dirty="0">
-              <a:solidFill>
-                <a:prstClr val="black"/>
-              </a:solidFill>
-            </a:endParaRPr>
           </a:p>
         </p:txBody>
       </p:sp>
@@ -16473,7 +16521,7 @@
         </p:spPr>
         <p:txBody>
           <a:bodyPr>
-            <a:normAutofit fontScale="92500" lnSpcReduction="10000"/>
+            <a:normAutofit fontScale="92500" lnSpcReduction="20000"/>
           </a:bodyPr>
           <a:lstStyle>
             <a:defPPr marR="0" lvl="0" algn="l" rtl="0">

</xml_diff>

<commit_message>
L01 Update presentation with correct repository mirroring instructions
</commit_message>
<xml_diff>
--- a/Lectures/Lesson 01 - Gitlab + Intellij IDEA.pptx
+++ b/Lectures/Lesson 01 - Gitlab + Intellij IDEA.pptx
@@ -683,7 +683,7 @@
           <a:p>
             <a:fld id="{E15541E6-0256-43E9-BC00-FD6AEADE0B20}" type="datetimeFigureOut">
               <a:rPr lang="en-US" smtClean="0"/>
-              <a:t>10/1/2019</a:t>
+              <a:t>03-Oct-19</a:t>
             </a:fld>
             <a:endParaRPr lang="en-US"/>
           </a:p>
@@ -842,7 +842,7 @@
           <a:p>
             <a:fld id="{46A72ACF-8CBE-46E1-8319-40131CE74C9D}" type="slidenum">
               <a:rPr lang="en-US" smtClean="0"/>
-              <a:t>‹#›</a:t>
+              <a:t>‹№›</a:t>
             </a:fld>
             <a:endParaRPr lang="en-US"/>
           </a:p>
@@ -4477,7 +4477,7 @@
           <a:p>
             <a:fld id="{A90B2C51-5890-490E-B5FE-9637AEB78E72}" type="slidenum">
               <a:rPr lang="en-US" smtClean="0"/>
-              <a:t>‹#›</a:t>
+              <a:t>‹№›</a:t>
             </a:fld>
             <a:endParaRPr lang="en-US"/>
           </a:p>
@@ -5067,7 +5067,7 @@
           <a:p>
             <a:fld id="{A90B2C51-5890-490E-B5FE-9637AEB78E72}" type="slidenum">
               <a:rPr lang="en-US" smtClean="0"/>
-              <a:t>‹#›</a:t>
+              <a:t>‹№›</a:t>
             </a:fld>
             <a:endParaRPr lang="en-US"/>
           </a:p>
@@ -5727,7 +5727,7 @@
           <a:p>
             <a:fld id="{A90B2C51-5890-490E-B5FE-9637AEB78E72}" type="slidenum">
               <a:rPr lang="en-US" smtClean="0"/>
-              <a:t>‹#›</a:t>
+              <a:t>‹№›</a:t>
             </a:fld>
             <a:endParaRPr lang="en-US"/>
           </a:p>
@@ -6520,7 +6520,7 @@
           <a:p>
             <a:fld id="{A90B2C51-5890-490E-B5FE-9637AEB78E72}" type="slidenum">
               <a:rPr lang="en-US" smtClean="0"/>
-              <a:t>‹#›</a:t>
+              <a:t>‹№›</a:t>
             </a:fld>
             <a:endParaRPr lang="en-US"/>
           </a:p>
@@ -6825,7 +6825,7 @@
           <a:p>
             <a:fld id="{A90B2C51-5890-490E-B5FE-9637AEB78E72}" type="slidenum">
               <a:rPr lang="en-US" smtClean="0"/>
-              <a:t>‹#›</a:t>
+              <a:t>‹№›</a:t>
             </a:fld>
             <a:endParaRPr lang="en-US"/>
           </a:p>
@@ -7219,7 +7219,7 @@
           <a:p>
             <a:fld id="{A90B2C51-5890-490E-B5FE-9637AEB78E72}" type="slidenum">
               <a:rPr lang="en-US" smtClean="0"/>
-              <a:t>‹#›</a:t>
+              <a:t>‹№›</a:t>
             </a:fld>
             <a:endParaRPr lang="en-US"/>
           </a:p>
@@ -7886,7 +7886,7 @@
           <a:p>
             <a:fld id="{A90B2C51-5890-490E-B5FE-9637AEB78E72}" type="slidenum">
               <a:rPr lang="en-US" smtClean="0"/>
-              <a:t>‹#›</a:t>
+              <a:t>‹№›</a:t>
             </a:fld>
             <a:endParaRPr lang="en-US"/>
           </a:p>
@@ -9202,12 +9202,391 @@
           </a:p>
         </p:txBody>
       </p:sp>
+      <p:sp>
+        <p:nvSpPr>
+          <p:cNvPr id="9" name="Місце для тексту 3">
+            <a:extLst>
+              <a:ext uri="{FF2B5EF4-FFF2-40B4-BE49-F238E27FC236}">
+                <a16:creationId xmlns:a16="http://schemas.microsoft.com/office/drawing/2014/main" id="{11E50773-1522-43DE-BD01-75867B50C5D8}"/>
+              </a:ext>
+            </a:extLst>
+          </p:cNvPr>
+          <p:cNvSpPr txBox="1">
+            <a:spLocks/>
+          </p:cNvSpPr>
+          <p:nvPr/>
+        </p:nvSpPr>
+        <p:spPr>
+          <a:xfrm>
+            <a:off x="839788" y="2057400"/>
+            <a:ext cx="3932237" cy="3811588"/>
+          </a:xfrm>
+          <a:prstGeom prst="rect">
+            <a:avLst/>
+          </a:prstGeom>
+        </p:spPr>
+        <p:txBody>
+          <a:bodyPr>
+            <a:normAutofit fontScale="92500" lnSpcReduction="10000"/>
+          </a:bodyPr>
+          <a:lstStyle>
+            <a:defPPr marR="0" lvl="0" algn="l" rtl="0">
+              <a:lnSpc>
+                <a:spcPct val="100000"/>
+              </a:lnSpc>
+              <a:spcBef>
+                <a:spcPts val="0"/>
+              </a:spcBef>
+              <a:spcAft>
+                <a:spcPts val="0"/>
+              </a:spcAft>
+            </a:defPPr>
+            <a:lvl1pPr marR="0" lvl="0" algn="l" rtl="0" eaLnBrk="1" hangingPunct="1">
+              <a:lnSpc>
+                <a:spcPct val="100000"/>
+              </a:lnSpc>
+              <a:spcBef>
+                <a:spcPts val="0"/>
+              </a:spcBef>
+              <a:spcAft>
+                <a:spcPts val="0"/>
+              </a:spcAft>
+              <a:buClr>
+                <a:srgbClr val="000000"/>
+              </a:buClr>
+              <a:buFont typeface="Arial"/>
+              <a:defRPr sz="1867" b="0" i="0" u="none" strike="noStrike" cap="none">
+                <a:solidFill>
+                  <a:srgbClr val="000000"/>
+                </a:solidFill>
+                <a:latin typeface="Arial"/>
+                <a:ea typeface="Arial"/>
+                <a:cs typeface="Arial"/>
+                <a:sym typeface="Arial"/>
+              </a:defRPr>
+            </a:lvl1pPr>
+            <a:lvl2pPr marR="0" lvl="1" algn="l" rtl="0" eaLnBrk="1" hangingPunct="1">
+              <a:lnSpc>
+                <a:spcPct val="100000"/>
+              </a:lnSpc>
+              <a:spcBef>
+                <a:spcPts val="0"/>
+              </a:spcBef>
+              <a:spcAft>
+                <a:spcPts val="0"/>
+              </a:spcAft>
+              <a:buClr>
+                <a:srgbClr val="000000"/>
+              </a:buClr>
+              <a:buFont typeface="Arial"/>
+              <a:defRPr sz="1867" b="0" i="0" u="none" strike="noStrike" cap="none">
+                <a:solidFill>
+                  <a:srgbClr val="000000"/>
+                </a:solidFill>
+                <a:latin typeface="Arial"/>
+                <a:ea typeface="Arial"/>
+                <a:cs typeface="Arial"/>
+                <a:sym typeface="Arial"/>
+              </a:defRPr>
+            </a:lvl2pPr>
+            <a:lvl3pPr marR="0" lvl="2" algn="l" rtl="0" eaLnBrk="1" hangingPunct="1">
+              <a:lnSpc>
+                <a:spcPct val="100000"/>
+              </a:lnSpc>
+              <a:spcBef>
+                <a:spcPts val="0"/>
+              </a:spcBef>
+              <a:spcAft>
+                <a:spcPts val="0"/>
+              </a:spcAft>
+              <a:buClr>
+                <a:srgbClr val="000000"/>
+              </a:buClr>
+              <a:buFont typeface="Arial"/>
+              <a:defRPr sz="1867" b="0" i="0" u="none" strike="noStrike" cap="none">
+                <a:solidFill>
+                  <a:srgbClr val="000000"/>
+                </a:solidFill>
+                <a:latin typeface="Arial"/>
+                <a:ea typeface="Arial"/>
+                <a:cs typeface="Arial"/>
+                <a:sym typeface="Arial"/>
+              </a:defRPr>
+            </a:lvl3pPr>
+            <a:lvl4pPr marR="0" lvl="3" algn="l" rtl="0" eaLnBrk="1" hangingPunct="1">
+              <a:lnSpc>
+                <a:spcPct val="100000"/>
+              </a:lnSpc>
+              <a:spcBef>
+                <a:spcPts val="0"/>
+              </a:spcBef>
+              <a:spcAft>
+                <a:spcPts val="0"/>
+              </a:spcAft>
+              <a:buClr>
+                <a:srgbClr val="000000"/>
+              </a:buClr>
+              <a:buFont typeface="Arial"/>
+              <a:defRPr sz="1867" b="0" i="0" u="none" strike="noStrike" cap="none">
+                <a:solidFill>
+                  <a:srgbClr val="000000"/>
+                </a:solidFill>
+                <a:latin typeface="Arial"/>
+                <a:ea typeface="Arial"/>
+                <a:cs typeface="Arial"/>
+                <a:sym typeface="Arial"/>
+              </a:defRPr>
+            </a:lvl4pPr>
+            <a:lvl5pPr marR="0" lvl="4" algn="l" rtl="0" eaLnBrk="1" hangingPunct="1">
+              <a:lnSpc>
+                <a:spcPct val="100000"/>
+              </a:lnSpc>
+              <a:spcBef>
+                <a:spcPts val="0"/>
+              </a:spcBef>
+              <a:spcAft>
+                <a:spcPts val="0"/>
+              </a:spcAft>
+              <a:buClr>
+                <a:srgbClr val="000000"/>
+              </a:buClr>
+              <a:buFont typeface="Arial"/>
+              <a:defRPr sz="1867" b="0" i="0" u="none" strike="noStrike" cap="none">
+                <a:solidFill>
+                  <a:srgbClr val="000000"/>
+                </a:solidFill>
+                <a:latin typeface="Arial"/>
+                <a:ea typeface="Arial"/>
+                <a:cs typeface="Arial"/>
+                <a:sym typeface="Arial"/>
+              </a:defRPr>
+            </a:lvl5pPr>
+            <a:lvl6pPr marR="0" lvl="5" algn="l" rtl="0" eaLnBrk="1" hangingPunct="1">
+              <a:lnSpc>
+                <a:spcPct val="100000"/>
+              </a:lnSpc>
+              <a:spcBef>
+                <a:spcPts val="0"/>
+              </a:spcBef>
+              <a:spcAft>
+                <a:spcPts val="0"/>
+              </a:spcAft>
+              <a:buClr>
+                <a:srgbClr val="000000"/>
+              </a:buClr>
+              <a:buFont typeface="Arial"/>
+              <a:defRPr sz="1867" b="0" i="0" u="none" strike="noStrike" cap="none">
+                <a:solidFill>
+                  <a:srgbClr val="000000"/>
+                </a:solidFill>
+                <a:latin typeface="Arial"/>
+                <a:ea typeface="Arial"/>
+                <a:cs typeface="Arial"/>
+                <a:sym typeface="Arial"/>
+              </a:defRPr>
+            </a:lvl6pPr>
+            <a:lvl7pPr marR="0" lvl="6" algn="l" rtl="0" eaLnBrk="1" hangingPunct="1">
+              <a:lnSpc>
+                <a:spcPct val="100000"/>
+              </a:lnSpc>
+              <a:spcBef>
+                <a:spcPts val="0"/>
+              </a:spcBef>
+              <a:spcAft>
+                <a:spcPts val="0"/>
+              </a:spcAft>
+              <a:buClr>
+                <a:srgbClr val="000000"/>
+              </a:buClr>
+              <a:buFont typeface="Arial"/>
+              <a:defRPr sz="1867" b="0" i="0" u="none" strike="noStrike" cap="none">
+                <a:solidFill>
+                  <a:srgbClr val="000000"/>
+                </a:solidFill>
+                <a:latin typeface="Arial"/>
+                <a:ea typeface="Arial"/>
+                <a:cs typeface="Arial"/>
+                <a:sym typeface="Arial"/>
+              </a:defRPr>
+            </a:lvl7pPr>
+            <a:lvl8pPr marR="0" lvl="7" algn="l" rtl="0" eaLnBrk="1" hangingPunct="1">
+              <a:lnSpc>
+                <a:spcPct val="100000"/>
+              </a:lnSpc>
+              <a:spcBef>
+                <a:spcPts val="0"/>
+              </a:spcBef>
+              <a:spcAft>
+                <a:spcPts val="0"/>
+              </a:spcAft>
+              <a:buClr>
+                <a:srgbClr val="000000"/>
+              </a:buClr>
+              <a:buFont typeface="Arial"/>
+              <a:defRPr sz="1867" b="0" i="0" u="none" strike="noStrike" cap="none">
+                <a:solidFill>
+                  <a:srgbClr val="000000"/>
+                </a:solidFill>
+                <a:latin typeface="Arial"/>
+                <a:ea typeface="Arial"/>
+                <a:cs typeface="Arial"/>
+                <a:sym typeface="Arial"/>
+              </a:defRPr>
+            </a:lvl8pPr>
+            <a:lvl9pPr marR="0" lvl="8" algn="l" rtl="0" eaLnBrk="1" hangingPunct="1">
+              <a:lnSpc>
+                <a:spcPct val="100000"/>
+              </a:lnSpc>
+              <a:spcBef>
+                <a:spcPts val="0"/>
+              </a:spcBef>
+              <a:spcAft>
+                <a:spcPts val="0"/>
+              </a:spcAft>
+              <a:buClr>
+                <a:srgbClr val="000000"/>
+              </a:buClr>
+              <a:buFont typeface="Arial"/>
+              <a:defRPr sz="1867" b="0" i="0" u="none" strike="noStrike" cap="none">
+                <a:solidFill>
+                  <a:srgbClr val="000000"/>
+                </a:solidFill>
+                <a:latin typeface="Arial"/>
+                <a:ea typeface="Arial"/>
+                <a:cs typeface="Arial"/>
+                <a:sym typeface="Arial"/>
+              </a:defRPr>
+            </a:lvl9pPr>
+          </a:lstStyle>
+          <a:p>
+            <a:pPr marL="228600" indent="-228600">
+              <a:lnSpc>
+                <a:spcPct val="150000"/>
+              </a:lnSpc>
+              <a:buFont typeface="Arial" panose="020B0604020202020204" pitchFamily="34" charset="0"/>
+              <a:buChar char="•"/>
+            </a:pPr>
+            <a:r>
+              <a:rPr lang="en-US" sz="2400" dirty="0">
+                <a:solidFill>
+                  <a:prstClr val="black"/>
+                </a:solidFill>
+              </a:rPr>
+              <a:t>Expand </a:t>
+            </a:r>
+            <a:r>
+              <a:rPr lang="en-US" sz="2400" b="1" dirty="0">
+                <a:solidFill>
+                  <a:prstClr val="black"/>
+                </a:solidFill>
+              </a:rPr>
+              <a:t>“Mirroring repositories” </a:t>
+            </a:r>
+            <a:r>
+              <a:rPr lang="en-US" sz="2400" dirty="0">
+                <a:solidFill>
+                  <a:prstClr val="black"/>
+                </a:solidFill>
+              </a:rPr>
+              <a:t>section</a:t>
+            </a:r>
+            <a:endParaRPr lang="en-US" sz="2400" b="1" dirty="0">
+              <a:solidFill>
+                <a:prstClr val="black"/>
+              </a:solidFill>
+            </a:endParaRPr>
+          </a:p>
+          <a:p>
+            <a:pPr marL="228600" indent="-228600">
+              <a:lnSpc>
+                <a:spcPct val="150000"/>
+              </a:lnSpc>
+              <a:buFont typeface="Arial" panose="020B0604020202020204" pitchFamily="34" charset="0"/>
+              <a:buChar char="•"/>
+            </a:pPr>
+            <a:r>
+              <a:rPr lang="en-US" sz="2400" dirty="0">
+                <a:solidFill>
+                  <a:prstClr val="black"/>
+                </a:solidFill>
+              </a:rPr>
+              <a:t>Paste or type </a:t>
+            </a:r>
+            <a:r>
+              <a:rPr lang="en-US" b="1" i="1" u="sng" dirty="0"/>
+              <a:t>https://gitlab.com/olexandr.kucher/geekhub9.git </a:t>
+            </a:r>
+            <a:r>
+              <a:rPr lang="en-US" sz="2400" dirty="0"/>
+              <a:t>into</a:t>
+            </a:r>
+            <a:r>
+              <a:rPr lang="en-US" dirty="0"/>
+              <a:t> </a:t>
+            </a:r>
+            <a:r>
+              <a:rPr lang="en-US" sz="2400" b="1" dirty="0"/>
+              <a:t>“Git repository URL”</a:t>
+            </a:r>
+            <a:r>
+              <a:rPr lang="en-US" sz="2400" i="1" dirty="0"/>
+              <a:t> </a:t>
+            </a:r>
+            <a:r>
+              <a:rPr lang="en-US" sz="2400" dirty="0"/>
+              <a:t>field</a:t>
+            </a:r>
+            <a:endParaRPr lang="en-US" b="1" dirty="0"/>
+          </a:p>
+          <a:p>
+            <a:pPr marL="228600" indent="-228600">
+              <a:lnSpc>
+                <a:spcPct val="150000"/>
+              </a:lnSpc>
+              <a:buFont typeface="Arial" panose="020B0604020202020204" pitchFamily="34" charset="0"/>
+              <a:buChar char="•"/>
+            </a:pPr>
+            <a:r>
+              <a:rPr lang="en-US" sz="2400" dirty="0">
+                <a:solidFill>
+                  <a:prstClr val="black"/>
+                </a:solidFill>
+              </a:rPr>
+              <a:t>Choose </a:t>
+            </a:r>
+            <a:r>
+              <a:rPr lang="en-US" sz="2400" b="1" dirty="0">
+                <a:solidFill>
+                  <a:prstClr val="black"/>
+                </a:solidFill>
+              </a:rPr>
+              <a:t>“Pull”</a:t>
+            </a:r>
+            <a:r>
+              <a:rPr lang="en-US" sz="2400" dirty="0">
+                <a:solidFill>
+                  <a:prstClr val="black"/>
+                </a:solidFill>
+              </a:rPr>
+              <a:t> as </a:t>
+            </a:r>
+            <a:r>
+              <a:rPr lang="en-US" sz="2400" b="1" dirty="0">
+                <a:solidFill>
+                  <a:prstClr val="black"/>
+                </a:solidFill>
+              </a:rPr>
+              <a:t>“Mirror direction”</a:t>
+            </a:r>
+          </a:p>
+        </p:txBody>
+      </p:sp>
       <p:pic>
         <p:nvPicPr>
-          <p:cNvPr id="8" name="Місце для вмісту 6">
+          <p:cNvPr id="3" name="Рисунок 2">
             <a:extLst>
               <a:ext uri="{FF2B5EF4-FFF2-40B4-BE49-F238E27FC236}">
-                <a16:creationId xmlns:a16="http://schemas.microsoft.com/office/drawing/2014/main" id="{BFB05B14-3987-4BCA-A69A-4877C4530C15}"/>
+                <a16:creationId xmlns:a16="http://schemas.microsoft.com/office/drawing/2014/main" id="{226FE105-5FA1-40A7-8FDE-ECAC29FA7A7F}"/>
               </a:ext>
             </a:extLst>
           </p:cNvPr>
@@ -9224,408 +9603,14 @@
         </p:blipFill>
         <p:spPr>
           <a:xfrm>
-            <a:off x="5180012" y="2083301"/>
-            <a:ext cx="6172200" cy="3786663"/>
+            <a:off x="5304918" y="1690688"/>
+            <a:ext cx="6463028" cy="4608036"/>
           </a:xfrm>
           <a:prstGeom prst="rect">
             <a:avLst/>
           </a:prstGeom>
-          <a:noFill/>
-          <a:ln>
-            <a:noFill/>
-          </a:ln>
         </p:spPr>
       </p:pic>
-      <p:sp>
-        <p:nvSpPr>
-          <p:cNvPr id="9" name="Місце для тексту 3">
-            <a:extLst>
-              <a:ext uri="{FF2B5EF4-FFF2-40B4-BE49-F238E27FC236}">
-                <a16:creationId xmlns:a16="http://schemas.microsoft.com/office/drawing/2014/main" id="{11E50773-1522-43DE-BD01-75867B50C5D8}"/>
-              </a:ext>
-            </a:extLst>
-          </p:cNvPr>
-          <p:cNvSpPr txBox="1">
-            <a:spLocks/>
-          </p:cNvSpPr>
-          <p:nvPr/>
-        </p:nvSpPr>
-        <p:spPr>
-          <a:xfrm>
-            <a:off x="839788" y="2057400"/>
-            <a:ext cx="3932237" cy="3811588"/>
-          </a:xfrm>
-          <a:prstGeom prst="rect">
-            <a:avLst/>
-          </a:prstGeom>
-        </p:spPr>
-        <p:txBody>
-          <a:bodyPr>
-            <a:normAutofit fontScale="92500" lnSpcReduction="10000"/>
-          </a:bodyPr>
-          <a:lstStyle>
-            <a:defPPr marR="0" lvl="0" algn="l" rtl="0">
-              <a:lnSpc>
-                <a:spcPct val="100000"/>
-              </a:lnSpc>
-              <a:spcBef>
-                <a:spcPts val="0"/>
-              </a:spcBef>
-              <a:spcAft>
-                <a:spcPts val="0"/>
-              </a:spcAft>
-            </a:defPPr>
-            <a:lvl1pPr marR="0" lvl="0" algn="l" rtl="0" eaLnBrk="1" hangingPunct="1">
-              <a:lnSpc>
-                <a:spcPct val="100000"/>
-              </a:lnSpc>
-              <a:spcBef>
-                <a:spcPts val="0"/>
-              </a:spcBef>
-              <a:spcAft>
-                <a:spcPts val="0"/>
-              </a:spcAft>
-              <a:buClr>
-                <a:srgbClr val="000000"/>
-              </a:buClr>
-              <a:buFont typeface="Arial"/>
-              <a:defRPr sz="1867" b="0" i="0" u="none" strike="noStrike" cap="none">
-                <a:solidFill>
-                  <a:srgbClr val="000000"/>
-                </a:solidFill>
-                <a:latin typeface="Arial"/>
-                <a:ea typeface="Arial"/>
-                <a:cs typeface="Arial"/>
-                <a:sym typeface="Arial"/>
-              </a:defRPr>
-            </a:lvl1pPr>
-            <a:lvl2pPr marR="0" lvl="1" algn="l" rtl="0" eaLnBrk="1" hangingPunct="1">
-              <a:lnSpc>
-                <a:spcPct val="100000"/>
-              </a:lnSpc>
-              <a:spcBef>
-                <a:spcPts val="0"/>
-              </a:spcBef>
-              <a:spcAft>
-                <a:spcPts val="0"/>
-              </a:spcAft>
-              <a:buClr>
-                <a:srgbClr val="000000"/>
-              </a:buClr>
-              <a:buFont typeface="Arial"/>
-              <a:defRPr sz="1867" b="0" i="0" u="none" strike="noStrike" cap="none">
-                <a:solidFill>
-                  <a:srgbClr val="000000"/>
-                </a:solidFill>
-                <a:latin typeface="Arial"/>
-                <a:ea typeface="Arial"/>
-                <a:cs typeface="Arial"/>
-                <a:sym typeface="Arial"/>
-              </a:defRPr>
-            </a:lvl2pPr>
-            <a:lvl3pPr marR="0" lvl="2" algn="l" rtl="0" eaLnBrk="1" hangingPunct="1">
-              <a:lnSpc>
-                <a:spcPct val="100000"/>
-              </a:lnSpc>
-              <a:spcBef>
-                <a:spcPts val="0"/>
-              </a:spcBef>
-              <a:spcAft>
-                <a:spcPts val="0"/>
-              </a:spcAft>
-              <a:buClr>
-                <a:srgbClr val="000000"/>
-              </a:buClr>
-              <a:buFont typeface="Arial"/>
-              <a:defRPr sz="1867" b="0" i="0" u="none" strike="noStrike" cap="none">
-                <a:solidFill>
-                  <a:srgbClr val="000000"/>
-                </a:solidFill>
-                <a:latin typeface="Arial"/>
-                <a:ea typeface="Arial"/>
-                <a:cs typeface="Arial"/>
-                <a:sym typeface="Arial"/>
-              </a:defRPr>
-            </a:lvl3pPr>
-            <a:lvl4pPr marR="0" lvl="3" algn="l" rtl="0" eaLnBrk="1" hangingPunct="1">
-              <a:lnSpc>
-                <a:spcPct val="100000"/>
-              </a:lnSpc>
-              <a:spcBef>
-                <a:spcPts val="0"/>
-              </a:spcBef>
-              <a:spcAft>
-                <a:spcPts val="0"/>
-              </a:spcAft>
-              <a:buClr>
-                <a:srgbClr val="000000"/>
-              </a:buClr>
-              <a:buFont typeface="Arial"/>
-              <a:defRPr sz="1867" b="0" i="0" u="none" strike="noStrike" cap="none">
-                <a:solidFill>
-                  <a:srgbClr val="000000"/>
-                </a:solidFill>
-                <a:latin typeface="Arial"/>
-                <a:ea typeface="Arial"/>
-                <a:cs typeface="Arial"/>
-                <a:sym typeface="Arial"/>
-              </a:defRPr>
-            </a:lvl4pPr>
-            <a:lvl5pPr marR="0" lvl="4" algn="l" rtl="0" eaLnBrk="1" hangingPunct="1">
-              <a:lnSpc>
-                <a:spcPct val="100000"/>
-              </a:lnSpc>
-              <a:spcBef>
-                <a:spcPts val="0"/>
-              </a:spcBef>
-              <a:spcAft>
-                <a:spcPts val="0"/>
-              </a:spcAft>
-              <a:buClr>
-                <a:srgbClr val="000000"/>
-              </a:buClr>
-              <a:buFont typeface="Arial"/>
-              <a:defRPr sz="1867" b="0" i="0" u="none" strike="noStrike" cap="none">
-                <a:solidFill>
-                  <a:srgbClr val="000000"/>
-                </a:solidFill>
-                <a:latin typeface="Arial"/>
-                <a:ea typeface="Arial"/>
-                <a:cs typeface="Arial"/>
-                <a:sym typeface="Arial"/>
-              </a:defRPr>
-            </a:lvl5pPr>
-            <a:lvl6pPr marR="0" lvl="5" algn="l" rtl="0" eaLnBrk="1" hangingPunct="1">
-              <a:lnSpc>
-                <a:spcPct val="100000"/>
-              </a:lnSpc>
-              <a:spcBef>
-                <a:spcPts val="0"/>
-              </a:spcBef>
-              <a:spcAft>
-                <a:spcPts val="0"/>
-              </a:spcAft>
-              <a:buClr>
-                <a:srgbClr val="000000"/>
-              </a:buClr>
-              <a:buFont typeface="Arial"/>
-              <a:defRPr sz="1867" b="0" i="0" u="none" strike="noStrike" cap="none">
-                <a:solidFill>
-                  <a:srgbClr val="000000"/>
-                </a:solidFill>
-                <a:latin typeface="Arial"/>
-                <a:ea typeface="Arial"/>
-                <a:cs typeface="Arial"/>
-                <a:sym typeface="Arial"/>
-              </a:defRPr>
-            </a:lvl6pPr>
-            <a:lvl7pPr marR="0" lvl="6" algn="l" rtl="0" eaLnBrk="1" hangingPunct="1">
-              <a:lnSpc>
-                <a:spcPct val="100000"/>
-              </a:lnSpc>
-              <a:spcBef>
-                <a:spcPts val="0"/>
-              </a:spcBef>
-              <a:spcAft>
-                <a:spcPts val="0"/>
-              </a:spcAft>
-              <a:buClr>
-                <a:srgbClr val="000000"/>
-              </a:buClr>
-              <a:buFont typeface="Arial"/>
-              <a:defRPr sz="1867" b="0" i="0" u="none" strike="noStrike" cap="none">
-                <a:solidFill>
-                  <a:srgbClr val="000000"/>
-                </a:solidFill>
-                <a:latin typeface="Arial"/>
-                <a:ea typeface="Arial"/>
-                <a:cs typeface="Arial"/>
-                <a:sym typeface="Arial"/>
-              </a:defRPr>
-            </a:lvl7pPr>
-            <a:lvl8pPr marR="0" lvl="7" algn="l" rtl="0" eaLnBrk="1" hangingPunct="1">
-              <a:lnSpc>
-                <a:spcPct val="100000"/>
-              </a:lnSpc>
-              <a:spcBef>
-                <a:spcPts val="0"/>
-              </a:spcBef>
-              <a:spcAft>
-                <a:spcPts val="0"/>
-              </a:spcAft>
-              <a:buClr>
-                <a:srgbClr val="000000"/>
-              </a:buClr>
-              <a:buFont typeface="Arial"/>
-              <a:defRPr sz="1867" b="0" i="0" u="none" strike="noStrike" cap="none">
-                <a:solidFill>
-                  <a:srgbClr val="000000"/>
-                </a:solidFill>
-                <a:latin typeface="Arial"/>
-                <a:ea typeface="Arial"/>
-                <a:cs typeface="Arial"/>
-                <a:sym typeface="Arial"/>
-              </a:defRPr>
-            </a:lvl8pPr>
-            <a:lvl9pPr marR="0" lvl="8" algn="l" rtl="0" eaLnBrk="1" hangingPunct="1">
-              <a:lnSpc>
-                <a:spcPct val="100000"/>
-              </a:lnSpc>
-              <a:spcBef>
-                <a:spcPts val="0"/>
-              </a:spcBef>
-              <a:spcAft>
-                <a:spcPts val="0"/>
-              </a:spcAft>
-              <a:buClr>
-                <a:srgbClr val="000000"/>
-              </a:buClr>
-              <a:buFont typeface="Arial"/>
-              <a:defRPr sz="1867" b="0" i="0" u="none" strike="noStrike" cap="none">
-                <a:solidFill>
-                  <a:srgbClr val="000000"/>
-                </a:solidFill>
-                <a:latin typeface="Arial"/>
-                <a:ea typeface="Arial"/>
-                <a:cs typeface="Arial"/>
-                <a:sym typeface="Arial"/>
-              </a:defRPr>
-            </a:lvl9pPr>
-          </a:lstStyle>
-          <a:p>
-            <a:pPr marL="228600" indent="-228600">
-              <a:lnSpc>
-                <a:spcPct val="150000"/>
-              </a:lnSpc>
-              <a:buFont typeface="Arial" panose="020B0604020202020204" pitchFamily="34" charset="0"/>
-              <a:buChar char="•"/>
-            </a:pPr>
-            <a:r>
-              <a:rPr lang="en-US" sz="2400">
-                <a:solidFill>
-                  <a:prstClr val="black"/>
-                </a:solidFill>
-              </a:rPr>
-              <a:t>Expand </a:t>
-            </a:r>
-            <a:r>
-              <a:rPr lang="en-US" sz="2400" b="1">
-                <a:solidFill>
-                  <a:prstClr val="black"/>
-                </a:solidFill>
-              </a:rPr>
-              <a:t>“Mirroring repositories” </a:t>
-            </a:r>
-            <a:r>
-              <a:rPr lang="en-US" sz="2400">
-                <a:solidFill>
-                  <a:prstClr val="black"/>
-                </a:solidFill>
-              </a:rPr>
-              <a:t>section</a:t>
-            </a:r>
-            <a:endParaRPr lang="en-US" sz="2400" b="1">
-              <a:solidFill>
-                <a:prstClr val="black"/>
-              </a:solidFill>
-            </a:endParaRPr>
-          </a:p>
-          <a:p>
-            <a:pPr marL="228600" indent="-228600">
-              <a:lnSpc>
-                <a:spcPct val="150000"/>
-              </a:lnSpc>
-              <a:buFont typeface="Arial" panose="020B0604020202020204" pitchFamily="34" charset="0"/>
-              <a:buChar char="•"/>
-            </a:pPr>
-            <a:r>
-              <a:rPr lang="en-US" sz="2400">
-                <a:solidFill>
-                  <a:prstClr val="black"/>
-                </a:solidFill>
-              </a:rPr>
-              <a:t>Paste or type </a:t>
-            </a:r>
-            <a:r>
-              <a:rPr lang="en-US" b="1" i="1">
-                <a:hlinkClick r:id="rId4"/>
-              </a:rPr>
-              <a:t>https://gitlab.com/olexandr.kucher/geekhub9</a:t>
-            </a:r>
-            <a:r>
-              <a:rPr lang="en-US" b="1" i="1"/>
-              <a:t> </a:t>
-            </a:r>
-            <a:r>
-              <a:rPr lang="en-US" sz="2400"/>
-              <a:t>into</a:t>
-            </a:r>
-            <a:r>
-              <a:rPr lang="en-US"/>
-              <a:t> </a:t>
-            </a:r>
-            <a:r>
-              <a:rPr lang="en-US" sz="2400" b="1"/>
-              <a:t>“Git repository URL”</a:t>
-            </a:r>
-            <a:r>
-              <a:rPr lang="en-US" sz="2400" i="1"/>
-              <a:t> </a:t>
-            </a:r>
-            <a:r>
-              <a:rPr lang="en-US" sz="2400"/>
-              <a:t>field</a:t>
-            </a:r>
-            <a:endParaRPr lang="en-US" b="1"/>
-          </a:p>
-          <a:p>
-            <a:pPr marL="228600" indent="-228600">
-              <a:lnSpc>
-                <a:spcPct val="150000"/>
-              </a:lnSpc>
-              <a:buFont typeface="Arial" panose="020B0604020202020204" pitchFamily="34" charset="0"/>
-              <a:buChar char="•"/>
-            </a:pPr>
-            <a:r>
-              <a:rPr lang="en-US" sz="2400">
-                <a:solidFill>
-                  <a:prstClr val="black"/>
-                </a:solidFill>
-              </a:rPr>
-              <a:t>Choose </a:t>
-            </a:r>
-            <a:r>
-              <a:rPr lang="en-US" sz="2400" b="1">
-                <a:solidFill>
-                  <a:prstClr val="black"/>
-                </a:solidFill>
-              </a:rPr>
-              <a:t>“Pull”</a:t>
-            </a:r>
-            <a:r>
-              <a:rPr lang="en-US" sz="2400">
-                <a:solidFill>
-                  <a:prstClr val="black"/>
-                </a:solidFill>
-              </a:rPr>
-              <a:t> as </a:t>
-            </a:r>
-            <a:r>
-              <a:rPr lang="en-US" sz="2400" b="1">
-                <a:solidFill>
-                  <a:prstClr val="black"/>
-                </a:solidFill>
-              </a:rPr>
-              <a:t>“Mirror direction”</a:t>
-            </a:r>
-            <a:endParaRPr lang="en-US" sz="2400" b="1" dirty="0">
-              <a:solidFill>
-                <a:prstClr val="black"/>
-              </a:solidFill>
-            </a:endParaRPr>
-          </a:p>
-        </p:txBody>
-      </p:sp>
     </p:spTree>
     <p:extLst>
       <p:ext uri="{BB962C8B-B14F-4D97-AF65-F5344CB8AC3E}">
@@ -9782,7 +9767,7 @@
         </p:spPr>
         <p:txBody>
           <a:bodyPr>
-            <a:normAutofit fontScale="92500" lnSpcReduction="20000"/>
+            <a:normAutofit fontScale="92500" lnSpcReduction="10000"/>
           </a:bodyPr>
           <a:lstStyle>
             <a:defPPr marR="0" lvl="0" algn="l" rtl="0">
@@ -10521,7 +10506,7 @@
               <a:buChar char="•"/>
             </a:pPr>
             <a:r>
-              <a:rPr lang="en-US" sz="2400">
+              <a:rPr lang="en-US" sz="2400" dirty="0">
                 <a:solidFill>
                   <a:prstClr val="black"/>
                 </a:solidFill>
@@ -10529,7 +10514,7 @@
               <a:t>Click </a:t>
             </a:r>
             <a:r>
-              <a:rPr lang="en-US" sz="2400" b="1">
+              <a:rPr lang="en-US" sz="2400" b="1" dirty="0">
                 <a:solidFill>
                   <a:prstClr val="black"/>
                 </a:solidFill>
@@ -10537,7 +10522,7 @@
               <a:t>“Project”</a:t>
             </a:r>
             <a:r>
-              <a:rPr lang="en-US" sz="2400">
+              <a:rPr lang="en-US" sz="2400" dirty="0">
                 <a:solidFill>
                   <a:prstClr val="black"/>
                 </a:solidFill>
@@ -10545,7 +10530,7 @@
               <a:t> -&gt; </a:t>
             </a:r>
             <a:r>
-              <a:rPr lang="en-US" sz="2400" b="1">
+              <a:rPr lang="en-US" sz="2400" b="1" dirty="0">
                 <a:solidFill>
                   <a:prstClr val="black"/>
                 </a:solidFill>
@@ -10553,7 +10538,7 @@
               <a:t>“Details”</a:t>
             </a:r>
             <a:r>
-              <a:rPr lang="en-US" sz="2400">
+              <a:rPr lang="en-US" sz="2400" dirty="0">
                 <a:solidFill>
                   <a:prstClr val="black"/>
                 </a:solidFill>
@@ -10570,18 +10555,13 @@
               <a:buChar char="•"/>
             </a:pPr>
             <a:r>
-              <a:rPr lang="en-US" sz="2400">
+              <a:rPr lang="en-US" sz="2400" dirty="0">
                 <a:solidFill>
                   <a:prstClr val="black"/>
                 </a:solidFill>
               </a:rPr>
               <a:t>Verify that all options in your repository are the same as on the screenshot</a:t>
             </a:r>
-            <a:endParaRPr lang="en-US" sz="2400" dirty="0">
-              <a:solidFill>
-                <a:prstClr val="black"/>
-              </a:solidFill>
-            </a:endParaRPr>
           </a:p>
         </p:txBody>
       </p:sp>
@@ -11514,7 +11494,7 @@
               <a:buChar char="•"/>
             </a:pPr>
             <a:r>
-              <a:rPr lang="en-US" sz="2400" dirty="0" smtClean="0">
+              <a:rPr lang="en-US" sz="2400" dirty="0">
                 <a:solidFill>
                   <a:prstClr val="black"/>
                 </a:solidFill>
@@ -11522,7 +11502,7 @@
               <a:t>Add </a:t>
             </a:r>
             <a:r>
-              <a:rPr lang="en-US" sz="2400" b="1" dirty="0" err="1" smtClean="0">
+              <a:rPr lang="en-US" sz="2400" b="1" dirty="0" err="1">
                 <a:solidFill>
                   <a:prstClr val="black"/>
                 </a:solidFill>
@@ -11530,7 +11510,7 @@
               <a:t>olexandr.kucher</a:t>
             </a:r>
             <a:r>
-              <a:rPr lang="en-US" sz="2400" b="1" dirty="0" smtClean="0">
+              <a:rPr lang="en-US" sz="2400" b="1" dirty="0">
                 <a:solidFill>
                   <a:prstClr val="black"/>
                 </a:solidFill>
@@ -11538,7 +11518,7 @@
               <a:t>, </a:t>
             </a:r>
             <a:r>
-              <a:rPr lang="en-US" sz="2400" b="1" dirty="0" err="1" smtClean="0">
+              <a:rPr lang="en-US" sz="2400" b="1" dirty="0" err="1">
                 <a:solidFill>
                   <a:prstClr val="black"/>
                 </a:solidFill>
@@ -11546,7 +11526,7 @@
               <a:t>y.brahinets</a:t>
             </a:r>
             <a:r>
-              <a:rPr lang="en-US" sz="2400" b="1" dirty="0" smtClean="0">
+              <a:rPr lang="en-US" sz="2400" b="1" dirty="0">
                 <a:solidFill>
                   <a:prstClr val="black"/>
                 </a:solidFill>
@@ -11554,7 +11534,7 @@
               <a:t>, </a:t>
             </a:r>
             <a:r>
-              <a:rPr lang="en-US" sz="2400" b="1" dirty="0" err="1" smtClean="0">
+              <a:rPr lang="en-US" sz="2400" b="1" dirty="0" err="1">
                 <a:solidFill>
                   <a:prstClr val="black"/>
                 </a:solidFill>
@@ -11562,15 +11542,39 @@
               <a:t>vrudas</a:t>
             </a:r>
             <a:r>
-              <a:rPr lang="en-US" sz="2400" b="1" dirty="0" smtClean="0">
+              <a:rPr lang="en-US" sz="2400" b="1" dirty="0">
                 <a:solidFill>
                   <a:prstClr val="black"/>
                 </a:solidFill>
               </a:rPr>
-              <a:t>,</a:t>
-            </a:r>
-            <a:r>
-              <a:rPr lang="en-US" sz="2400" b="1" dirty="0" smtClean="0">
+              <a:t>, </a:t>
+            </a:r>
+            <a:r>
+              <a:rPr lang="en-US" sz="2400" b="1" dirty="0" err="1">
+                <a:solidFill>
+                  <a:prstClr val="black"/>
+                </a:solidFill>
+              </a:rPr>
+              <a:t>InnaBakum</a:t>
+            </a:r>
+            <a:r>
+              <a:rPr lang="en-US" sz="2400" b="1" dirty="0">
+                <a:solidFill>
+                  <a:prstClr val="black"/>
+                </a:solidFill>
+              </a:rPr>
+              <a:t>, </a:t>
+            </a:r>
+            <a:r>
+              <a:rPr lang="en-US" sz="2400" b="1" dirty="0" err="1"/>
+              <a:t>mudrenko.vlad</a:t>
+            </a:r>
+            <a:r>
+              <a:rPr lang="en-US" sz="2400" b="1" dirty="0"/>
+              <a:t>, michaelsav4enko</a:t>
+            </a:r>
+            <a:r>
+              <a:rPr lang="en-US" sz="2400" b="1" dirty="0">
                 <a:solidFill>
                   <a:prstClr val="black"/>
                 </a:solidFill>
@@ -11578,39 +11582,7 @@
               <a:t> </a:t>
             </a:r>
             <a:r>
-              <a:rPr lang="en-US" sz="2400" b="1" dirty="0" err="1" smtClean="0">
-                <a:solidFill>
-                  <a:prstClr val="black"/>
-                </a:solidFill>
-              </a:rPr>
-              <a:t>InnaBakum</a:t>
-            </a:r>
-            <a:r>
-              <a:rPr lang="en-US" sz="2400" b="1" dirty="0" smtClean="0">
-                <a:solidFill>
-                  <a:prstClr val="black"/>
-                </a:solidFill>
-              </a:rPr>
-              <a:t>, </a:t>
-            </a:r>
-            <a:r>
-              <a:rPr lang="en-US" sz="2400" b="1" dirty="0" err="1" smtClean="0"/>
-              <a:t>mudrenko.vlad</a:t>
-            </a:r>
-            <a:r>
-              <a:rPr lang="en-US" sz="2400" b="1" dirty="0" smtClean="0"/>
-              <a:t>, michaelsav4enko</a:t>
-            </a:r>
-            <a:r>
-              <a:rPr lang="en-US" sz="2400" b="1" dirty="0" smtClean="0">
-                <a:solidFill>
-                  <a:prstClr val="black"/>
-                </a:solidFill>
-              </a:rPr>
-              <a:t> </a:t>
-            </a:r>
-            <a:r>
-              <a:rPr lang="en-US" sz="2400" dirty="0" smtClean="0">
+              <a:rPr lang="en-US" sz="2400" dirty="0">
                 <a:solidFill>
                   <a:prstClr val="black"/>
                 </a:solidFill>
@@ -11618,18 +11590,13 @@
               <a:t>as </a:t>
             </a:r>
             <a:r>
-              <a:rPr lang="en-US" sz="2400" b="1" dirty="0" smtClean="0">
+              <a:rPr lang="en-US" sz="2400" b="1" dirty="0">
                 <a:solidFill>
                   <a:prstClr val="black"/>
                 </a:solidFill>
               </a:rPr>
               <a:t>Reporter</a:t>
             </a:r>
-            <a:endParaRPr lang="en-US" sz="2400" b="1" dirty="0">
-              <a:solidFill>
-                <a:prstClr val="black"/>
-              </a:solidFill>
-            </a:endParaRPr>
           </a:p>
           <a:p>
             <a:pPr marL="228600" indent="-228600">
@@ -15274,20 +15241,12 @@
               <a:t>Type understandable and informative </a:t>
             </a:r>
             <a:r>
-              <a:rPr lang="en-US" sz="2400" b="1" dirty="0" smtClean="0">
+              <a:rPr lang="en-US" sz="2400" b="1" dirty="0">
                 <a:solidFill>
                   <a:prstClr val="black"/>
                 </a:solidFill>
               </a:rPr>
-              <a:t>“L## Commit </a:t>
-            </a:r>
-            <a:r>
-              <a:rPr lang="en-US" sz="2400" b="1" dirty="0">
-                <a:solidFill>
-                  <a:prstClr val="black"/>
-                </a:solidFill>
-              </a:rPr>
-              <a:t>Message”</a:t>
+              <a:t>“L## Commit Message”</a:t>
             </a:r>
           </a:p>
           <a:p>
@@ -16521,7 +16480,7 @@
         </p:spPr>
         <p:txBody>
           <a:bodyPr>
-            <a:normAutofit fontScale="92500" lnSpcReduction="20000"/>
+            <a:normAutofit fontScale="92500" lnSpcReduction="10000"/>
           </a:bodyPr>
           <a:lstStyle>
             <a:defPPr marR="0" lvl="0" algn="l" rtl="0">

</xml_diff>